<commit_message>
correcoes no pen and paper 3
</commit_message>
<xml_diff>
--- a/Homework3/rede.pptx
+++ b/Homework3/rede.pptx
@@ -259,7 +259,7 @@
           <a:p>
             <a:fld id="{80363D34-735B-4446-AC78-908362347469}" type="datetimeFigureOut">
               <a:rPr lang="pt-PT" smtClean="0"/>
-              <a:t>18/10/23</a:t>
+              <a:t>20/10/23</a:t>
             </a:fld>
             <a:endParaRPr lang="pt-PT"/>
           </a:p>
@@ -457,7 +457,7 @@
           <a:p>
             <a:fld id="{80363D34-735B-4446-AC78-908362347469}" type="datetimeFigureOut">
               <a:rPr lang="pt-PT" smtClean="0"/>
-              <a:t>18/10/23</a:t>
+              <a:t>20/10/23</a:t>
             </a:fld>
             <a:endParaRPr lang="pt-PT"/>
           </a:p>
@@ -665,7 +665,7 @@
           <a:p>
             <a:fld id="{80363D34-735B-4446-AC78-908362347469}" type="datetimeFigureOut">
               <a:rPr lang="pt-PT" smtClean="0"/>
-              <a:t>18/10/23</a:t>
+              <a:t>20/10/23</a:t>
             </a:fld>
             <a:endParaRPr lang="pt-PT"/>
           </a:p>
@@ -863,7 +863,7 @@
           <a:p>
             <a:fld id="{80363D34-735B-4446-AC78-908362347469}" type="datetimeFigureOut">
               <a:rPr lang="pt-PT" smtClean="0"/>
-              <a:t>18/10/23</a:t>
+              <a:t>20/10/23</a:t>
             </a:fld>
             <a:endParaRPr lang="pt-PT"/>
           </a:p>
@@ -1138,7 +1138,7 @@
           <a:p>
             <a:fld id="{80363D34-735B-4446-AC78-908362347469}" type="datetimeFigureOut">
               <a:rPr lang="pt-PT" smtClean="0"/>
-              <a:t>18/10/23</a:t>
+              <a:t>20/10/23</a:t>
             </a:fld>
             <a:endParaRPr lang="pt-PT"/>
           </a:p>
@@ -1403,7 +1403,7 @@
           <a:p>
             <a:fld id="{80363D34-735B-4446-AC78-908362347469}" type="datetimeFigureOut">
               <a:rPr lang="pt-PT" smtClean="0"/>
-              <a:t>18/10/23</a:t>
+              <a:t>20/10/23</a:t>
             </a:fld>
             <a:endParaRPr lang="pt-PT"/>
           </a:p>
@@ -1815,7 +1815,7 @@
           <a:p>
             <a:fld id="{80363D34-735B-4446-AC78-908362347469}" type="datetimeFigureOut">
               <a:rPr lang="pt-PT" smtClean="0"/>
-              <a:t>18/10/23</a:t>
+              <a:t>20/10/23</a:t>
             </a:fld>
             <a:endParaRPr lang="pt-PT"/>
           </a:p>
@@ -1956,7 +1956,7 @@
           <a:p>
             <a:fld id="{80363D34-735B-4446-AC78-908362347469}" type="datetimeFigureOut">
               <a:rPr lang="pt-PT" smtClean="0"/>
-              <a:t>18/10/23</a:t>
+              <a:t>20/10/23</a:t>
             </a:fld>
             <a:endParaRPr lang="pt-PT"/>
           </a:p>
@@ -2069,7 +2069,7 @@
           <a:p>
             <a:fld id="{80363D34-735B-4446-AC78-908362347469}" type="datetimeFigureOut">
               <a:rPr lang="pt-PT" smtClean="0"/>
-              <a:t>18/10/23</a:t>
+              <a:t>20/10/23</a:t>
             </a:fld>
             <a:endParaRPr lang="pt-PT"/>
           </a:p>
@@ -2380,7 +2380,7 @@
           <a:p>
             <a:fld id="{80363D34-735B-4446-AC78-908362347469}" type="datetimeFigureOut">
               <a:rPr lang="pt-PT" smtClean="0"/>
-              <a:t>18/10/23</a:t>
+              <a:t>20/10/23</a:t>
             </a:fld>
             <a:endParaRPr lang="pt-PT"/>
           </a:p>
@@ -2668,7 +2668,7 @@
           <a:p>
             <a:fld id="{80363D34-735B-4446-AC78-908362347469}" type="datetimeFigureOut">
               <a:rPr lang="pt-PT" smtClean="0"/>
-              <a:t>18/10/23</a:t>
+              <a:t>20/10/23</a:t>
             </a:fld>
             <a:endParaRPr lang="pt-PT"/>
           </a:p>
@@ -2909,7 +2909,7 @@
           <a:p>
             <a:fld id="{80363D34-735B-4446-AC78-908362347469}" type="datetimeFigureOut">
               <a:rPr lang="pt-PT" smtClean="0"/>
-              <a:t>18/10/23</a:t>
+              <a:t>20/10/23</a:t>
             </a:fld>
             <a:endParaRPr lang="pt-PT"/>
           </a:p>
@@ -7714,8 +7714,8 @@
           </p:sp>
         </mc:Fallback>
       </mc:AlternateContent>
-      <mc:AlternateContent xmlns:mc="http://schemas.openxmlformats.org/markup-compatibility/2006" xmlns:a14="http://schemas.microsoft.com/office/drawing/2010/main">
-        <mc:Choice Requires="a14">
+      <mc:AlternateContent xmlns:mc="http://schemas.openxmlformats.org/markup-compatibility/2006">
+        <mc:Choice xmlns:a14="http://schemas.microsoft.com/office/drawing/2010/main" Requires="a14">
           <p:sp>
             <p:nvSpPr>
               <p:cNvPr id="232" name="TextBox 231">
@@ -7731,7 +7731,7 @@
             <p:spPr>
               <a:xfrm>
                 <a:off x="8190493" y="2660230"/>
-                <a:ext cx="455701" cy="369332"/>
+                <a:ext cx="461024" cy="369332"/>
               </a:xfrm>
               <a:prstGeom prst="rect">
                 <a:avLst/>
@@ -7772,7 +7772,7 @@
                             <a:rPr lang="pt-PT" b="0" i="1" smtClean="0">
                               <a:latin typeface="Cambria Math" panose="02040503050406030204" pitchFamily="18" charset="0"/>
                             </a:rPr>
-                            <m:t>1</m:t>
+                            <m:t>2</m:t>
                           </m:r>
                         </m:sub>
                       </m:sSub>
@@ -7784,7 +7784,7 @@
             </p:txBody>
           </p:sp>
         </mc:Choice>
-        <mc:Fallback xmlns="">
+        <mc:Fallback>
           <p:sp>
             <p:nvSpPr>
               <p:cNvPr id="232" name="TextBox 231">
@@ -7802,7 +7802,7 @@
             <p:spPr>
               <a:xfrm>
                 <a:off x="8190493" y="2660230"/>
-                <a:ext cx="455701" cy="369332"/>
+                <a:ext cx="461024" cy="369332"/>
               </a:xfrm>
               <a:prstGeom prst="rect">
                 <a:avLst/>
@@ -7829,8 +7829,8 @@
           </p:sp>
         </mc:Fallback>
       </mc:AlternateContent>
-      <mc:AlternateContent xmlns:mc="http://schemas.openxmlformats.org/markup-compatibility/2006" xmlns:a14="http://schemas.microsoft.com/office/drawing/2010/main">
-        <mc:Choice Requires="a14">
+      <mc:AlternateContent xmlns:mc="http://schemas.openxmlformats.org/markup-compatibility/2006">
+        <mc:Choice xmlns:a14="http://schemas.microsoft.com/office/drawing/2010/main" Requires="a14">
           <p:sp>
             <p:nvSpPr>
               <p:cNvPr id="233" name="TextBox 232">
@@ -7846,7 +7846,7 @@
             <p:spPr>
               <a:xfrm>
                 <a:off x="8188471" y="4053288"/>
-                <a:ext cx="455701" cy="369332"/>
+                <a:ext cx="461024" cy="369332"/>
               </a:xfrm>
               <a:prstGeom prst="rect">
                 <a:avLst/>
@@ -7887,7 +7887,7 @@
                             <a:rPr lang="pt-PT" b="0" i="1" smtClean="0">
                               <a:latin typeface="Cambria Math" panose="02040503050406030204" pitchFamily="18" charset="0"/>
                             </a:rPr>
-                            <m:t>1</m:t>
+                            <m:t>3</m:t>
                           </m:r>
                         </m:sub>
                       </m:sSub>
@@ -7899,7 +7899,7 @@
             </p:txBody>
           </p:sp>
         </mc:Choice>
-        <mc:Fallback xmlns="">
+        <mc:Fallback>
           <p:sp>
             <p:nvSpPr>
               <p:cNvPr id="233" name="TextBox 232">
@@ -7917,13 +7917,13 @@
             <p:spPr>
               <a:xfrm>
                 <a:off x="8188471" y="4053288"/>
-                <a:ext cx="455701" cy="369332"/>
+                <a:ext cx="461024" cy="369332"/>
               </a:xfrm>
               <a:prstGeom prst="rect">
                 <a:avLst/>
               </a:prstGeom>
               <a:blipFill>
-                <a:blip r:embed="rId15"/>
+                <a:blip r:embed="rId17"/>
                 <a:stretch>
                   <a:fillRect/>
                 </a:stretch>
@@ -7944,8 +7944,8 @@
           </p:sp>
         </mc:Fallback>
       </mc:AlternateContent>
-      <mc:AlternateContent xmlns:mc="http://schemas.openxmlformats.org/markup-compatibility/2006" xmlns:a14="http://schemas.microsoft.com/office/drawing/2010/main">
-        <mc:Choice Requires="a14">
+      <mc:AlternateContent xmlns:mc="http://schemas.openxmlformats.org/markup-compatibility/2006">
+        <mc:Choice xmlns:a14="http://schemas.microsoft.com/office/drawing/2010/main" Requires="a14">
           <p:sp>
             <p:nvSpPr>
               <p:cNvPr id="161" name="TextBox 160">
@@ -8041,7 +8041,29 @@
                           </a:solidFill>
                           <a:latin typeface="Cambria Math" panose="02040503050406030204" pitchFamily="18" charset="0"/>
                         </a:rPr>
-                        <m:t>     </m:t>
+                        <m:t>    </m:t>
+                      </m:r>
+                      <m:r>
+                        <a:rPr lang="pt-PT" sz="2400" b="0" i="1" smtClean="0">
+                          <a:solidFill>
+                            <a:schemeClr val="accent1">
+                              <a:lumMod val="75000"/>
+                            </a:schemeClr>
+                          </a:solidFill>
+                          <a:latin typeface="Cambria Math" panose="02040503050406030204" pitchFamily="18" charset="0"/>
+                        </a:rPr>
+                        <m:t>   </m:t>
+                      </m:r>
+                      <m:r>
+                        <a:rPr lang="pt-PT" sz="2400" b="0" i="1" smtClean="0">
+                          <a:solidFill>
+                            <a:schemeClr val="accent1">
+                              <a:lumMod val="75000"/>
+                            </a:schemeClr>
+                          </a:solidFill>
+                          <a:latin typeface="Cambria Math" panose="02040503050406030204" pitchFamily="18" charset="0"/>
+                        </a:rPr>
+                        <m:t> </m:t>
                       </m:r>
                       <m:sSup>
                         <m:sSupPr>
@@ -8097,6 +8119,17 @@
                           </m:ctrlPr>
                         </m:sSupPr>
                         <m:e>
+                          <m:r>
+                            <a:rPr lang="pt-PT" sz="2400" b="0" i="1" smtClean="0">
+                              <a:solidFill>
+                                <a:schemeClr val="accent1">
+                                  <a:lumMod val="75000"/>
+                                </a:schemeClr>
+                              </a:solidFill>
+                              <a:latin typeface="Cambria Math" panose="02040503050406030204" pitchFamily="18" charset="0"/>
+                            </a:rPr>
+                            <m:t> </m:t>
+                          </m:r>
                           <m:r>
                             <a:rPr lang="pt-PT" sz="2400" i="1">
                               <a:solidFill>
@@ -8218,6 +8251,17 @@
                           </m:r>
                         </m:sup>
                       </m:sSup>
+                      <m:r>
+                        <a:rPr lang="pt-PT" sz="2400" b="0" i="1" smtClean="0">
+                          <a:solidFill>
+                            <a:schemeClr val="accent1">
+                              <a:lumMod val="75000"/>
+                            </a:schemeClr>
+                          </a:solidFill>
+                          <a:latin typeface="Cambria Math" panose="02040503050406030204" pitchFamily="18" charset="0"/>
+                        </a:rPr>
+                        <m:t> </m:t>
+                      </m:r>
                       <m:sSup>
                         <m:sSupPr>
                           <m:ctrlPr>
@@ -8289,7 +8333,7 @@
                           </a:solidFill>
                           <a:latin typeface="Cambria Math" panose="02040503050406030204" pitchFamily="18" charset="0"/>
                         </a:rPr>
-                        <m:t>              </m:t>
+                        <m:t>             </m:t>
                       </m:r>
                       <m:sSup>
                         <m:sSupPr>
@@ -8433,7 +8477,7 @@
             </p:txBody>
           </p:sp>
         </mc:Choice>
-        <mc:Fallback xmlns="">
+        <mc:Fallback>
           <p:sp>
             <p:nvSpPr>
               <p:cNvPr id="161" name="TextBox 160">
@@ -8457,9 +8501,9 @@
                 <a:avLst/>
               </a:prstGeom>
               <a:blipFill>
-                <a:blip r:embed="rId17"/>
+                <a:blip r:embed="rId18"/>
                 <a:stretch>
-                  <a:fillRect r="-3711" b="-17949"/>
+                  <a:fillRect r="-7813" b="-17949"/>
                 </a:stretch>
               </a:blipFill>
             </p:spPr>
@@ -8747,7 +8791,7 @@
                 <a:avLst/>
               </a:prstGeom>
               <a:blipFill>
-                <a:blip r:embed="rId18"/>
+                <a:blip r:embed="rId19"/>
                 <a:stretch>
                   <a:fillRect/>
                 </a:stretch>
@@ -8768,6 +8812,590 @@
           </p:sp>
         </mc:Fallback>
       </mc:AlternateContent>
+      <p:sp>
+        <p:nvSpPr>
+          <p:cNvPr id="11" name="Curved Up Arrow 10">
+            <a:extLst>
+              <a:ext uri="{FF2B5EF4-FFF2-40B4-BE49-F238E27FC236}">
+                <a16:creationId xmlns:a16="http://schemas.microsoft.com/office/drawing/2014/main" id="{FE461FC9-4502-7840-80D6-885EC3D5A638}"/>
+              </a:ext>
+            </a:extLst>
+          </p:cNvPr>
+          <p:cNvSpPr/>
+          <p:nvPr/>
+        </p:nvSpPr>
+        <p:spPr>
+          <a:xfrm>
+            <a:off x="3657600" y="5800491"/>
+            <a:ext cx="709863" cy="395772"/>
+          </a:xfrm>
+          <a:prstGeom prst="curvedUpArrow">
+            <a:avLst>
+              <a:gd name="adj1" fmla="val 25000"/>
+              <a:gd name="adj2" fmla="val 50000"/>
+              <a:gd name="adj3" fmla="val 28122"/>
+            </a:avLst>
+          </a:prstGeom>
+          <a:ln>
+            <a:noFill/>
+          </a:ln>
+        </p:spPr>
+        <p:style>
+          <a:lnRef idx="2">
+            <a:schemeClr val="accent1">
+              <a:shade val="50000"/>
+            </a:schemeClr>
+          </a:lnRef>
+          <a:fillRef idx="1">
+            <a:schemeClr val="accent1"/>
+          </a:fillRef>
+          <a:effectRef idx="0">
+            <a:schemeClr val="accent1"/>
+          </a:effectRef>
+          <a:fontRef idx="minor">
+            <a:schemeClr val="lt1"/>
+          </a:fontRef>
+        </p:style>
+        <p:txBody>
+          <a:bodyPr rtlCol="0" anchor="ctr"/>
+          <a:lstStyle/>
+          <a:p>
+            <a:pPr algn="ctr"/>
+            <a:endParaRPr lang="en-US">
+              <a:solidFill>
+                <a:schemeClr val="tx1"/>
+              </a:solidFill>
+            </a:endParaRPr>
+          </a:p>
+        </p:txBody>
+      </p:sp>
+      <p:sp>
+        <p:nvSpPr>
+          <p:cNvPr id="76" name="Curved Up Arrow 75">
+            <a:extLst>
+              <a:ext uri="{FF2B5EF4-FFF2-40B4-BE49-F238E27FC236}">
+                <a16:creationId xmlns:a16="http://schemas.microsoft.com/office/drawing/2014/main" id="{9C27DA92-C923-C444-BA37-80ED3C3BB803}"/>
+              </a:ext>
+            </a:extLst>
+          </p:cNvPr>
+          <p:cNvSpPr/>
+          <p:nvPr/>
+        </p:nvSpPr>
+        <p:spPr>
+          <a:xfrm>
+            <a:off x="5741340" y="5804610"/>
+            <a:ext cx="709863" cy="395772"/>
+          </a:xfrm>
+          <a:prstGeom prst="curvedUpArrow">
+            <a:avLst/>
+          </a:prstGeom>
+          <a:ln>
+            <a:noFill/>
+          </a:ln>
+        </p:spPr>
+        <p:style>
+          <a:lnRef idx="2">
+            <a:schemeClr val="accent1">
+              <a:shade val="50000"/>
+            </a:schemeClr>
+          </a:lnRef>
+          <a:fillRef idx="1">
+            <a:schemeClr val="accent1"/>
+          </a:fillRef>
+          <a:effectRef idx="0">
+            <a:schemeClr val="accent1"/>
+          </a:effectRef>
+          <a:fontRef idx="minor">
+            <a:schemeClr val="lt1"/>
+          </a:fontRef>
+        </p:style>
+        <p:txBody>
+          <a:bodyPr rtlCol="0" anchor="ctr"/>
+          <a:lstStyle/>
+          <a:p>
+            <a:pPr algn="ctr"/>
+            <a:endParaRPr lang="en-US">
+              <a:solidFill>
+                <a:schemeClr val="tx1"/>
+              </a:solidFill>
+            </a:endParaRPr>
+          </a:p>
+        </p:txBody>
+      </p:sp>
+      <mc:AlternateContent xmlns:mc="http://schemas.openxmlformats.org/markup-compatibility/2006">
+        <mc:Choice xmlns:a14="http://schemas.microsoft.com/office/drawing/2010/main" Requires="a14">
+          <p:sp>
+            <p:nvSpPr>
+              <p:cNvPr id="18" name="TextBox 17">
+                <a:extLst>
+                  <a:ext uri="{FF2B5EF4-FFF2-40B4-BE49-F238E27FC236}">
+                    <a16:creationId xmlns:a16="http://schemas.microsoft.com/office/drawing/2014/main" id="{60F1E04F-DB0F-A549-B25A-C3ED8B8F02C6}"/>
+                  </a:ext>
+                </a:extLst>
+              </p:cNvPr>
+              <p:cNvSpPr txBox="1"/>
+              <p:nvPr/>
+            </p:nvSpPr>
+            <p:spPr>
+              <a:xfrm>
+                <a:off x="3718001" y="6195128"/>
+                <a:ext cx="801373" cy="477438"/>
+              </a:xfrm>
+              <a:prstGeom prst="rect">
+                <a:avLst/>
+              </a:prstGeom>
+              <a:noFill/>
+            </p:spPr>
+            <p:txBody>
+              <a:bodyPr wrap="none" rtlCol="0">
+                <a:spAutoFit/>
+              </a:bodyPr>
+              <a:lstStyle/>
+              <a:p>
+                <a14:m>
+                  <m:oMathPara xmlns:m="http://schemas.openxmlformats.org/officeDocument/2006/math">
+                    <m:oMathParaPr>
+                      <m:jc m:val="centerGroup"/>
+                    </m:oMathParaPr>
+                    <m:oMath xmlns:m="http://schemas.openxmlformats.org/officeDocument/2006/math">
+                      <m:sSup>
+                        <m:sSupPr>
+                          <m:ctrlPr>
+                            <a:rPr lang="el-GR" sz="2400" i="1" smtClean="0">
+                              <a:solidFill>
+                                <a:schemeClr val="accent1">
+                                  <a:lumMod val="75000"/>
+                                </a:schemeClr>
+                              </a:solidFill>
+                              <a:latin typeface="Cambria Math" panose="02040503050406030204" pitchFamily="18" charset="0"/>
+                              <a:ea typeface="Cambria Math" panose="02040503050406030204" pitchFamily="18" charset="0"/>
+                            </a:rPr>
+                          </m:ctrlPr>
+                        </m:sSupPr>
+                        <m:e>
+                          <m:r>
+                            <m:rPr>
+                              <m:sty m:val="p"/>
+                            </m:rPr>
+                            <a:rPr lang="el-GR" sz="2400" i="1" smtClean="0">
+                              <a:solidFill>
+                                <a:schemeClr val="accent1">
+                                  <a:lumMod val="75000"/>
+                                </a:schemeClr>
+                              </a:solidFill>
+                              <a:latin typeface="Cambria Math" panose="02040503050406030204" pitchFamily="18" charset="0"/>
+                              <a:ea typeface="Cambria Math" panose="02040503050406030204" pitchFamily="18" charset="0"/>
+                            </a:rPr>
+                            <m:t>Φ</m:t>
+                          </m:r>
+                        </m:e>
+                        <m:sup>
+                          <m:r>
+                            <a:rPr lang="pt-PT" sz="2400" b="0" i="1" smtClean="0">
+                              <a:solidFill>
+                                <a:schemeClr val="accent1">
+                                  <a:lumMod val="75000"/>
+                                </a:schemeClr>
+                              </a:solidFill>
+                              <a:latin typeface="Cambria Math" panose="02040503050406030204" pitchFamily="18" charset="0"/>
+                              <a:ea typeface="Cambria Math" panose="02040503050406030204" pitchFamily="18" charset="0"/>
+                            </a:rPr>
+                            <m:t>[1]</m:t>
+                          </m:r>
+                        </m:sup>
+                      </m:sSup>
+                    </m:oMath>
+                  </m:oMathPara>
+                </a14:m>
+                <a:endParaRPr lang="en-US" sz="2400" dirty="0"/>
+              </a:p>
+            </p:txBody>
+          </p:sp>
+        </mc:Choice>
+        <mc:Fallback>
+          <p:sp>
+            <p:nvSpPr>
+              <p:cNvPr id="18" name="TextBox 17">
+                <a:extLst>
+                  <a:ext uri="{FF2B5EF4-FFF2-40B4-BE49-F238E27FC236}">
+                    <a16:creationId xmlns:a16="http://schemas.microsoft.com/office/drawing/2014/main" id="{60F1E04F-DB0F-A549-B25A-C3ED8B8F02C6}"/>
+                  </a:ext>
+                </a:extLst>
+              </p:cNvPr>
+              <p:cNvSpPr txBox="1">
+                <a:spLocks noRot="1" noChangeAspect="1" noMove="1" noResize="1" noEditPoints="1" noAdjustHandles="1" noChangeArrowheads="1" noChangeShapeType="1" noTextEdit="1"/>
+              </p:cNvSpPr>
+              <p:nvPr/>
+            </p:nvSpPr>
+            <p:spPr>
+              <a:xfrm>
+                <a:off x="3718001" y="6195128"/>
+                <a:ext cx="801373" cy="477438"/>
+              </a:xfrm>
+              <a:prstGeom prst="rect">
+                <a:avLst/>
+              </a:prstGeom>
+              <a:blipFill>
+                <a:blip r:embed="rId20"/>
+                <a:stretch>
+                  <a:fillRect/>
+                </a:stretch>
+              </a:blipFill>
+            </p:spPr>
+            <p:txBody>
+              <a:bodyPr/>
+              <a:lstStyle/>
+              <a:p>
+                <a:r>
+                  <a:rPr lang="en-US">
+                    <a:noFill/>
+                  </a:rPr>
+                  <a:t> </a:t>
+                </a:r>
+              </a:p>
+            </p:txBody>
+          </p:sp>
+        </mc:Fallback>
+      </mc:AlternateContent>
+      <mc:AlternateContent xmlns:mc="http://schemas.openxmlformats.org/markup-compatibility/2006">
+        <mc:Choice xmlns:a14="http://schemas.microsoft.com/office/drawing/2010/main" Requires="a14">
+          <p:sp>
+            <p:nvSpPr>
+              <p:cNvPr id="83" name="TextBox 82">
+                <a:extLst>
+                  <a:ext uri="{FF2B5EF4-FFF2-40B4-BE49-F238E27FC236}">
+                    <a16:creationId xmlns:a16="http://schemas.microsoft.com/office/drawing/2014/main" id="{51C11FD3-4655-3847-9260-533588A498D1}"/>
+                  </a:ext>
+                </a:extLst>
+              </p:cNvPr>
+              <p:cNvSpPr txBox="1"/>
+              <p:nvPr/>
+            </p:nvSpPr>
+            <p:spPr>
+              <a:xfrm>
+                <a:off x="5720544" y="6194438"/>
+                <a:ext cx="801373" cy="477438"/>
+              </a:xfrm>
+              <a:prstGeom prst="rect">
+                <a:avLst/>
+              </a:prstGeom>
+              <a:noFill/>
+            </p:spPr>
+            <p:txBody>
+              <a:bodyPr wrap="none" rtlCol="0">
+                <a:spAutoFit/>
+              </a:bodyPr>
+              <a:lstStyle/>
+              <a:p>
+                <a14:m>
+                  <m:oMathPara xmlns:m="http://schemas.openxmlformats.org/officeDocument/2006/math">
+                    <m:oMathParaPr>
+                      <m:jc m:val="centerGroup"/>
+                    </m:oMathParaPr>
+                    <m:oMath xmlns:m="http://schemas.openxmlformats.org/officeDocument/2006/math">
+                      <m:sSup>
+                        <m:sSupPr>
+                          <m:ctrlPr>
+                            <a:rPr lang="el-GR" sz="2400" i="1" smtClean="0">
+                              <a:solidFill>
+                                <a:schemeClr val="accent1">
+                                  <a:lumMod val="75000"/>
+                                </a:schemeClr>
+                              </a:solidFill>
+                              <a:latin typeface="Cambria Math" panose="02040503050406030204" pitchFamily="18" charset="0"/>
+                              <a:ea typeface="Cambria Math" panose="02040503050406030204" pitchFamily="18" charset="0"/>
+                            </a:rPr>
+                          </m:ctrlPr>
+                        </m:sSupPr>
+                        <m:e>
+                          <m:r>
+                            <m:rPr>
+                              <m:sty m:val="p"/>
+                            </m:rPr>
+                            <a:rPr lang="el-GR" sz="2400" i="1" smtClean="0">
+                              <a:solidFill>
+                                <a:schemeClr val="accent1">
+                                  <a:lumMod val="75000"/>
+                                </a:schemeClr>
+                              </a:solidFill>
+                              <a:latin typeface="Cambria Math" panose="02040503050406030204" pitchFamily="18" charset="0"/>
+                              <a:ea typeface="Cambria Math" panose="02040503050406030204" pitchFamily="18" charset="0"/>
+                            </a:rPr>
+                            <m:t>Φ</m:t>
+                          </m:r>
+                        </m:e>
+                        <m:sup>
+                          <m:r>
+                            <a:rPr lang="pt-PT" sz="2400" b="0" i="1" smtClean="0">
+                              <a:solidFill>
+                                <a:schemeClr val="accent1">
+                                  <a:lumMod val="75000"/>
+                                </a:schemeClr>
+                              </a:solidFill>
+                              <a:latin typeface="Cambria Math" panose="02040503050406030204" pitchFamily="18" charset="0"/>
+                              <a:ea typeface="Cambria Math" panose="02040503050406030204" pitchFamily="18" charset="0"/>
+                            </a:rPr>
+                            <m:t>[2]</m:t>
+                          </m:r>
+                        </m:sup>
+                      </m:sSup>
+                    </m:oMath>
+                  </m:oMathPara>
+                </a14:m>
+                <a:endParaRPr lang="en-US" sz="2400" dirty="0"/>
+              </a:p>
+            </p:txBody>
+          </p:sp>
+        </mc:Choice>
+        <mc:Fallback>
+          <p:sp>
+            <p:nvSpPr>
+              <p:cNvPr id="83" name="TextBox 82">
+                <a:extLst>
+                  <a:ext uri="{FF2B5EF4-FFF2-40B4-BE49-F238E27FC236}">
+                    <a16:creationId xmlns:a16="http://schemas.microsoft.com/office/drawing/2014/main" id="{51C11FD3-4655-3847-9260-533588A498D1}"/>
+                  </a:ext>
+                </a:extLst>
+              </p:cNvPr>
+              <p:cNvSpPr txBox="1">
+                <a:spLocks noRot="1" noChangeAspect="1" noMove="1" noResize="1" noEditPoints="1" noAdjustHandles="1" noChangeArrowheads="1" noChangeShapeType="1" noTextEdit="1"/>
+              </p:cNvSpPr>
+              <p:nvPr/>
+            </p:nvSpPr>
+            <p:spPr>
+              <a:xfrm>
+                <a:off x="5720544" y="6194438"/>
+                <a:ext cx="801373" cy="477438"/>
+              </a:xfrm>
+              <a:prstGeom prst="rect">
+                <a:avLst/>
+              </a:prstGeom>
+              <a:blipFill>
+                <a:blip r:embed="rId21"/>
+                <a:stretch>
+                  <a:fillRect/>
+                </a:stretch>
+              </a:blipFill>
+            </p:spPr>
+            <p:txBody>
+              <a:bodyPr/>
+              <a:lstStyle/>
+              <a:p>
+                <a:r>
+                  <a:rPr lang="en-US">
+                    <a:noFill/>
+                  </a:rPr>
+                  <a:t> </a:t>
+                </a:r>
+              </a:p>
+            </p:txBody>
+          </p:sp>
+        </mc:Fallback>
+      </mc:AlternateContent>
+      <mc:AlternateContent xmlns:mc="http://schemas.openxmlformats.org/markup-compatibility/2006">
+        <mc:Choice xmlns:a14="http://schemas.microsoft.com/office/drawing/2010/main" Requires="a14">
+          <p:sp>
+            <p:nvSpPr>
+              <p:cNvPr id="84" name="TextBox 83">
+                <a:extLst>
+                  <a:ext uri="{FF2B5EF4-FFF2-40B4-BE49-F238E27FC236}">
+                    <a16:creationId xmlns:a16="http://schemas.microsoft.com/office/drawing/2014/main" id="{E0A038E4-ABB7-A844-B657-B58E268F3F14}"/>
+                  </a:ext>
+                </a:extLst>
+              </p:cNvPr>
+              <p:cNvSpPr txBox="1"/>
+              <p:nvPr/>
+            </p:nvSpPr>
+            <p:spPr>
+              <a:xfrm>
+                <a:off x="7565628" y="6209262"/>
+                <a:ext cx="801373" cy="477438"/>
+              </a:xfrm>
+              <a:prstGeom prst="rect">
+                <a:avLst/>
+              </a:prstGeom>
+              <a:noFill/>
+            </p:spPr>
+            <p:txBody>
+              <a:bodyPr wrap="none" rtlCol="0">
+                <a:spAutoFit/>
+              </a:bodyPr>
+              <a:lstStyle/>
+              <a:p>
+                <a14:m>
+                  <m:oMathPara xmlns:m="http://schemas.openxmlformats.org/officeDocument/2006/math">
+                    <m:oMathParaPr>
+                      <m:jc m:val="centerGroup"/>
+                    </m:oMathParaPr>
+                    <m:oMath xmlns:m="http://schemas.openxmlformats.org/officeDocument/2006/math">
+                      <m:sSup>
+                        <m:sSupPr>
+                          <m:ctrlPr>
+                            <a:rPr lang="el-GR" sz="2400" i="1" smtClean="0">
+                              <a:solidFill>
+                                <a:schemeClr val="accent6">
+                                  <a:lumMod val="60000"/>
+                                  <a:lumOff val="40000"/>
+                                </a:schemeClr>
+                              </a:solidFill>
+                              <a:latin typeface="Cambria Math" panose="02040503050406030204" pitchFamily="18" charset="0"/>
+                              <a:ea typeface="Cambria Math" panose="02040503050406030204" pitchFamily="18" charset="0"/>
+                            </a:rPr>
+                          </m:ctrlPr>
+                        </m:sSupPr>
+                        <m:e>
+                          <m:r>
+                            <m:rPr>
+                              <m:sty m:val="p"/>
+                            </m:rPr>
+                            <a:rPr lang="el-GR" sz="2400" i="1" smtClean="0">
+                              <a:solidFill>
+                                <a:schemeClr val="accent6">
+                                  <a:lumMod val="60000"/>
+                                  <a:lumOff val="40000"/>
+                                </a:schemeClr>
+                              </a:solidFill>
+                              <a:latin typeface="Cambria Math" panose="02040503050406030204" pitchFamily="18" charset="0"/>
+                              <a:ea typeface="Cambria Math" panose="02040503050406030204" pitchFamily="18" charset="0"/>
+                            </a:rPr>
+                            <m:t>Φ</m:t>
+                          </m:r>
+                        </m:e>
+                        <m:sup>
+                          <m:r>
+                            <a:rPr lang="pt-PT" sz="2400" b="0" i="1" smtClean="0">
+                              <a:solidFill>
+                                <a:schemeClr val="accent6">
+                                  <a:lumMod val="60000"/>
+                                  <a:lumOff val="40000"/>
+                                </a:schemeClr>
+                              </a:solidFill>
+                              <a:latin typeface="Cambria Math" panose="02040503050406030204" pitchFamily="18" charset="0"/>
+                              <a:ea typeface="Cambria Math" panose="02040503050406030204" pitchFamily="18" charset="0"/>
+                            </a:rPr>
+                            <m:t>[3]</m:t>
+                          </m:r>
+                        </m:sup>
+                      </m:sSup>
+                    </m:oMath>
+                  </m:oMathPara>
+                </a14:m>
+                <a:endParaRPr lang="en-US" sz="2400" dirty="0">
+                  <a:solidFill>
+                    <a:schemeClr val="accent6">
+                      <a:lumMod val="60000"/>
+                      <a:lumOff val="40000"/>
+                    </a:schemeClr>
+                  </a:solidFill>
+                </a:endParaRPr>
+              </a:p>
+            </p:txBody>
+          </p:sp>
+        </mc:Choice>
+        <mc:Fallback>
+          <p:sp>
+            <p:nvSpPr>
+              <p:cNvPr id="84" name="TextBox 83">
+                <a:extLst>
+                  <a:ext uri="{FF2B5EF4-FFF2-40B4-BE49-F238E27FC236}">
+                    <a16:creationId xmlns:a16="http://schemas.microsoft.com/office/drawing/2014/main" id="{E0A038E4-ABB7-A844-B657-B58E268F3F14}"/>
+                  </a:ext>
+                </a:extLst>
+              </p:cNvPr>
+              <p:cNvSpPr txBox="1">
+                <a:spLocks noRot="1" noChangeAspect="1" noMove="1" noResize="1" noEditPoints="1" noAdjustHandles="1" noChangeArrowheads="1" noChangeShapeType="1" noTextEdit="1"/>
+              </p:cNvSpPr>
+              <p:nvPr/>
+            </p:nvSpPr>
+            <p:spPr>
+              <a:xfrm>
+                <a:off x="7565628" y="6209262"/>
+                <a:ext cx="801373" cy="477438"/>
+              </a:xfrm>
+              <a:prstGeom prst="rect">
+                <a:avLst/>
+              </a:prstGeom>
+              <a:blipFill>
+                <a:blip r:embed="rId22"/>
+                <a:stretch>
+                  <a:fillRect/>
+                </a:stretch>
+              </a:blipFill>
+            </p:spPr>
+            <p:txBody>
+              <a:bodyPr/>
+              <a:lstStyle/>
+              <a:p>
+                <a:r>
+                  <a:rPr lang="en-US">
+                    <a:noFill/>
+                  </a:rPr>
+                  <a:t> </a:t>
+                </a:r>
+              </a:p>
+            </p:txBody>
+          </p:sp>
+        </mc:Fallback>
+      </mc:AlternateContent>
+      <p:sp>
+        <p:nvSpPr>
+          <p:cNvPr id="85" name="Curved Up Arrow 84">
+            <a:extLst>
+              <a:ext uri="{FF2B5EF4-FFF2-40B4-BE49-F238E27FC236}">
+                <a16:creationId xmlns:a16="http://schemas.microsoft.com/office/drawing/2014/main" id="{EC1FFDD0-6D4E-5641-B70F-7B0E64DEEE3E}"/>
+              </a:ext>
+            </a:extLst>
+          </p:cNvPr>
+          <p:cNvSpPr/>
+          <p:nvPr/>
+        </p:nvSpPr>
+        <p:spPr>
+          <a:xfrm>
+            <a:off x="7611384" y="5798666"/>
+            <a:ext cx="709863" cy="395772"/>
+          </a:xfrm>
+          <a:prstGeom prst="curvedUpArrow">
+            <a:avLst/>
+          </a:prstGeom>
+          <a:solidFill>
+            <a:schemeClr val="accent6">
+              <a:lumMod val="60000"/>
+              <a:lumOff val="40000"/>
+            </a:schemeClr>
+          </a:solidFill>
+          <a:ln>
+            <a:noFill/>
+          </a:ln>
+        </p:spPr>
+        <p:style>
+          <a:lnRef idx="2">
+            <a:schemeClr val="accent1">
+              <a:shade val="50000"/>
+            </a:schemeClr>
+          </a:lnRef>
+          <a:fillRef idx="1">
+            <a:schemeClr val="accent1"/>
+          </a:fillRef>
+          <a:effectRef idx="0">
+            <a:schemeClr val="accent1"/>
+          </a:effectRef>
+          <a:fontRef idx="minor">
+            <a:schemeClr val="lt1"/>
+          </a:fontRef>
+        </p:style>
+        <p:txBody>
+          <a:bodyPr rtlCol="0" anchor="ctr"/>
+          <a:lstStyle/>
+          <a:p>
+            <a:pPr algn="ctr"/>
+            <a:endParaRPr lang="en-US" dirty="0">
+              <a:solidFill>
+                <a:schemeClr val="tx1"/>
+              </a:solidFill>
+            </a:endParaRPr>
+          </a:p>
+        </p:txBody>
+      </p:sp>
     </p:spTree>
     <p:extLst>
       <p:ext uri="{BB962C8B-B14F-4D97-AF65-F5344CB8AC3E}">

</xml_diff>